<commit_message>
Added measurement setup figure
</commit_message>
<xml_diff>
--- a/images/sources/Figures.pptx
+++ b/images/sources/Figures.pptx
@@ -15,6 +15,7 @@
     <p:sldId id="263" r:id="rId9"/>
     <p:sldId id="264" r:id="rId10"/>
     <p:sldId id="265" r:id="rId11"/>
+    <p:sldId id="266" r:id="rId12"/>
   </p:sldIdLst>
   <p:sldSz cx="9144000" cy="6858000" type="screen4x3"/>
   <p:notesSz cx="6858000" cy="9144000"/>
@@ -3977,6 +3978,645 @@
 </p:sld>
 </file>
 
+<file path=ppt/slides/slide11.xml><?xml version="1.0" encoding="utf-8"?>
+<p:sld xmlns:a="http://schemas.openxmlformats.org/drawingml/2006/main" xmlns:r="http://schemas.openxmlformats.org/officeDocument/2006/relationships" xmlns:p="http://schemas.openxmlformats.org/presentationml/2006/main">
+  <p:cSld>
+    <p:spTree>
+      <p:nvGrpSpPr>
+        <p:cNvPr id="1" name=""/>
+        <p:cNvGrpSpPr/>
+        <p:nvPr/>
+      </p:nvGrpSpPr>
+      <p:grpSpPr>
+        <a:xfrm>
+          <a:off x="0" y="0"/>
+          <a:ext cx="0" cy="0"/>
+          <a:chOff x="0" y="0"/>
+          <a:chExt cx="0" cy="0"/>
+        </a:xfrm>
+      </p:grpSpPr>
+      <p:sp>
+        <p:nvSpPr>
+          <p:cNvPr id="6" name="Rounded Rectangle 5">
+            <a:extLst>
+              <a:ext uri="{FF2B5EF4-FFF2-40B4-BE49-F238E27FC236}">
+                <a16:creationId xmlns:a16="http://schemas.microsoft.com/office/drawing/2014/main" id="{F1467E3C-070F-3440-BA64-FCB10ABBC2C4}"/>
+              </a:ext>
+            </a:extLst>
+          </p:cNvPr>
+          <p:cNvSpPr/>
+          <p:nvPr/>
+        </p:nvSpPr>
+        <p:spPr>
+          <a:xfrm>
+            <a:off x="1579417" y="2310937"/>
+            <a:ext cx="2202872" cy="1745673"/>
+          </a:xfrm>
+          <a:prstGeom prst="roundRect">
+            <a:avLst>
+              <a:gd name="adj" fmla="val 3278"/>
+            </a:avLst>
+          </a:prstGeom>
+        </p:spPr>
+        <p:style>
+          <a:lnRef idx="2">
+            <a:schemeClr val="dk1"/>
+          </a:lnRef>
+          <a:fillRef idx="1">
+            <a:schemeClr val="lt1"/>
+          </a:fillRef>
+          <a:effectRef idx="0">
+            <a:schemeClr val="dk1"/>
+          </a:effectRef>
+          <a:fontRef idx="minor">
+            <a:schemeClr val="dk1"/>
+          </a:fontRef>
+        </p:style>
+        <p:txBody>
+          <a:bodyPr rtlCol="0" anchor="ctr"/>
+          <a:lstStyle/>
+          <a:p>
+            <a:pPr algn="ctr"/>
+            <a:endParaRPr lang="en-US"/>
+          </a:p>
+        </p:txBody>
+      </p:sp>
+      <p:sp>
+        <p:nvSpPr>
+          <p:cNvPr id="4" name="TextBox 3">
+            <a:extLst>
+              <a:ext uri="{FF2B5EF4-FFF2-40B4-BE49-F238E27FC236}">
+                <a16:creationId xmlns:a16="http://schemas.microsoft.com/office/drawing/2014/main" id="{217B6819-67F1-0D4C-995E-4F3192D08698}"/>
+              </a:ext>
+            </a:extLst>
+          </p:cNvPr>
+          <p:cNvSpPr txBox="1"/>
+          <p:nvPr/>
+        </p:nvSpPr>
+        <p:spPr>
+          <a:xfrm>
+            <a:off x="2038695" y="2569645"/>
+            <a:ext cx="1284316" cy="535531"/>
+          </a:xfrm>
+          <a:prstGeom prst="rect">
+            <a:avLst/>
+          </a:prstGeom>
+          <a:ln>
+            <a:noFill/>
+          </a:ln>
+        </p:spPr>
+        <p:style>
+          <a:lnRef idx="2">
+            <a:schemeClr val="accent1"/>
+          </a:lnRef>
+          <a:fillRef idx="1">
+            <a:schemeClr val="lt1"/>
+          </a:fillRef>
+          <a:effectRef idx="0">
+            <a:schemeClr val="accent1"/>
+          </a:effectRef>
+          <a:fontRef idx="minor">
+            <a:schemeClr val="dk1"/>
+          </a:fontRef>
+        </p:style>
+        <p:txBody>
+          <a:bodyPr wrap="square" rtlCol="0">
+            <a:spAutoFit/>
+          </a:bodyPr>
+          <a:lstStyle/>
+          <a:p>
+            <a:pPr algn="ctr"/>
+            <a:r>
+              <a:rPr lang="en-US" sz="1440" dirty="0" err="1"/>
+              <a:t>EyeCandy</a:t>
+            </a:r>
+            <a:endParaRPr lang="en-US" sz="1440" dirty="0"/>
+          </a:p>
+          <a:p>
+            <a:pPr algn="ctr"/>
+            <a:r>
+              <a:rPr lang="en-US" sz="1440" dirty="0"/>
+              <a:t>Computer</a:t>
+            </a:r>
+          </a:p>
+        </p:txBody>
+      </p:sp>
+      <p:sp>
+        <p:nvSpPr>
+          <p:cNvPr id="7" name="Rounded Rectangle 6">
+            <a:extLst>
+              <a:ext uri="{FF2B5EF4-FFF2-40B4-BE49-F238E27FC236}">
+                <a16:creationId xmlns:a16="http://schemas.microsoft.com/office/drawing/2014/main" id="{0446CABC-C3E7-9E47-BF35-9176906869F3}"/>
+              </a:ext>
+            </a:extLst>
+          </p:cNvPr>
+          <p:cNvSpPr/>
+          <p:nvPr/>
+        </p:nvSpPr>
+        <p:spPr>
+          <a:xfrm>
+            <a:off x="2457795" y="3363884"/>
+            <a:ext cx="1324494" cy="692727"/>
+          </a:xfrm>
+          <a:prstGeom prst="roundRect">
+            <a:avLst>
+              <a:gd name="adj" fmla="val 3278"/>
+            </a:avLst>
+          </a:prstGeom>
+        </p:spPr>
+        <p:style>
+          <a:lnRef idx="2">
+            <a:schemeClr val="dk1"/>
+          </a:lnRef>
+          <a:fillRef idx="1">
+            <a:schemeClr val="lt1"/>
+          </a:fillRef>
+          <a:effectRef idx="0">
+            <a:schemeClr val="dk1"/>
+          </a:effectRef>
+          <a:fontRef idx="minor">
+            <a:schemeClr val="dk1"/>
+          </a:fontRef>
+        </p:style>
+        <p:txBody>
+          <a:bodyPr rtlCol="0" anchor="ctr"/>
+          <a:lstStyle/>
+          <a:p>
+            <a:pPr algn="ctr"/>
+            <a:endParaRPr lang="en-US"/>
+          </a:p>
+        </p:txBody>
+      </p:sp>
+      <p:sp>
+        <p:nvSpPr>
+          <p:cNvPr id="8" name="TextBox 7">
+            <a:extLst>
+              <a:ext uri="{FF2B5EF4-FFF2-40B4-BE49-F238E27FC236}">
+                <a16:creationId xmlns:a16="http://schemas.microsoft.com/office/drawing/2014/main" id="{87195615-4664-1743-A23B-8EE304F1E1C4}"/>
+              </a:ext>
+            </a:extLst>
+          </p:cNvPr>
+          <p:cNvSpPr txBox="1"/>
+          <p:nvPr/>
+        </p:nvSpPr>
+        <p:spPr>
+          <a:xfrm>
+            <a:off x="2554083" y="3553281"/>
+            <a:ext cx="1131917" cy="313932"/>
+          </a:xfrm>
+          <a:prstGeom prst="rect">
+            <a:avLst/>
+          </a:prstGeom>
+          <a:ln>
+            <a:noFill/>
+          </a:ln>
+        </p:spPr>
+        <p:style>
+          <a:lnRef idx="2">
+            <a:schemeClr val="accent1"/>
+          </a:lnRef>
+          <a:fillRef idx="1">
+            <a:schemeClr val="lt1"/>
+          </a:fillRef>
+          <a:effectRef idx="0">
+            <a:schemeClr val="accent1"/>
+          </a:effectRef>
+          <a:fontRef idx="minor">
+            <a:schemeClr val="dk1"/>
+          </a:fontRef>
+        </p:style>
+        <p:txBody>
+          <a:bodyPr wrap="square" rtlCol="0">
+            <a:spAutoFit/>
+          </a:bodyPr>
+          <a:lstStyle/>
+          <a:p>
+            <a:pPr algn="ctr"/>
+            <a:r>
+              <a:rPr lang="en-US" sz="1440" dirty="0"/>
+              <a:t>Timing card</a:t>
+            </a:r>
+          </a:p>
+        </p:txBody>
+      </p:sp>
+      <p:pic>
+        <p:nvPicPr>
+          <p:cNvPr id="10" name="Graphic 9">
+            <a:extLst>
+              <a:ext uri="{FF2B5EF4-FFF2-40B4-BE49-F238E27FC236}">
+                <a16:creationId xmlns:a16="http://schemas.microsoft.com/office/drawing/2014/main" id="{69305DB0-48E3-1641-8CF1-682BEF781E1F}"/>
+              </a:ext>
+            </a:extLst>
+          </p:cNvPr>
+          <p:cNvPicPr>
+            <a:picLocks noChangeAspect="1"/>
+          </p:cNvPicPr>
+          <p:nvPr/>
+        </p:nvPicPr>
+        <p:blipFill>
+          <a:blip r:embed="rId2">
+            <a:extLst>
+              <a:ext uri="{96DAC541-7B7A-43D3-8B79-37D633B846F1}">
+                <asvg:svgBlip xmlns:asvg="http://schemas.microsoft.com/office/drawing/2016/SVG/main" r:embed="rId3"/>
+              </a:ext>
+            </a:extLst>
+          </a:blip>
+          <a:stretch>
+            <a:fillRect/>
+          </a:stretch>
+        </p:blipFill>
+        <p:spPr>
+          <a:xfrm>
+            <a:off x="4709486" y="2209425"/>
+            <a:ext cx="1052947" cy="1052947"/>
+          </a:xfrm>
+          <a:prstGeom prst="rect">
+            <a:avLst/>
+          </a:prstGeom>
+        </p:spPr>
+      </p:pic>
+      <p:sp>
+        <p:nvSpPr>
+          <p:cNvPr id="11" name="TextBox 10">
+            <a:extLst>
+              <a:ext uri="{FF2B5EF4-FFF2-40B4-BE49-F238E27FC236}">
+                <a16:creationId xmlns:a16="http://schemas.microsoft.com/office/drawing/2014/main" id="{85E06032-45DB-AF46-96D7-9755C712A77F}"/>
+              </a:ext>
+            </a:extLst>
+          </p:cNvPr>
+          <p:cNvSpPr txBox="1"/>
+          <p:nvPr/>
+        </p:nvSpPr>
+        <p:spPr>
+          <a:xfrm>
+            <a:off x="4665020" y="3223792"/>
+            <a:ext cx="1131917" cy="313932"/>
+          </a:xfrm>
+          <a:prstGeom prst="rect">
+            <a:avLst/>
+          </a:prstGeom>
+          <a:ln>
+            <a:noFill/>
+          </a:ln>
+        </p:spPr>
+        <p:style>
+          <a:lnRef idx="2">
+            <a:schemeClr val="accent1"/>
+          </a:lnRef>
+          <a:fillRef idx="1">
+            <a:schemeClr val="lt1"/>
+          </a:fillRef>
+          <a:effectRef idx="0">
+            <a:schemeClr val="accent1"/>
+          </a:effectRef>
+          <a:fontRef idx="minor">
+            <a:schemeClr val="dk1"/>
+          </a:fontRef>
+        </p:style>
+        <p:txBody>
+          <a:bodyPr wrap="square" rtlCol="0">
+            <a:spAutoFit/>
+          </a:bodyPr>
+          <a:lstStyle/>
+          <a:p>
+            <a:pPr algn="ctr"/>
+            <a:r>
+              <a:rPr lang="en-US" sz="1440" dirty="0"/>
+              <a:t>Projector</a:t>
+            </a:r>
+          </a:p>
+        </p:txBody>
+      </p:sp>
+      <p:cxnSp>
+        <p:nvCxnSpPr>
+          <p:cNvPr id="13" name="Straight Connector 12">
+            <a:extLst>
+              <a:ext uri="{FF2B5EF4-FFF2-40B4-BE49-F238E27FC236}">
+                <a16:creationId xmlns:a16="http://schemas.microsoft.com/office/drawing/2014/main" id="{98CEFAB8-D18A-BD4B-9B4B-30A0AD73E877}"/>
+              </a:ext>
+            </a:extLst>
+          </p:cNvPr>
+          <p:cNvCxnSpPr>
+            <a:cxnSpLocks/>
+          </p:cNvCxnSpPr>
+          <p:nvPr/>
+        </p:nvCxnSpPr>
+        <p:spPr>
+          <a:xfrm>
+            <a:off x="3847853" y="2975956"/>
+            <a:ext cx="913929" cy="0"/>
+          </a:xfrm>
+          <a:prstGeom prst="line">
+            <a:avLst/>
+          </a:prstGeom>
+          <a:ln w="19050">
+            <a:solidFill>
+              <a:schemeClr val="tx1">
+                <a:lumMod val="75000"/>
+                <a:lumOff val="25000"/>
+              </a:schemeClr>
+            </a:solidFill>
+            <a:prstDash val="dash"/>
+          </a:ln>
+        </p:spPr>
+        <p:style>
+          <a:lnRef idx="1">
+            <a:schemeClr val="accent1"/>
+          </a:lnRef>
+          <a:fillRef idx="0">
+            <a:schemeClr val="accent1"/>
+          </a:fillRef>
+          <a:effectRef idx="0">
+            <a:schemeClr val="accent1"/>
+          </a:effectRef>
+          <a:fontRef idx="minor">
+            <a:schemeClr val="tx1"/>
+          </a:fontRef>
+        </p:style>
+      </p:cxnSp>
+      <p:sp>
+        <p:nvSpPr>
+          <p:cNvPr id="16" name="Rounded Rectangle 15">
+            <a:extLst>
+              <a:ext uri="{FF2B5EF4-FFF2-40B4-BE49-F238E27FC236}">
+                <a16:creationId xmlns:a16="http://schemas.microsoft.com/office/drawing/2014/main" id="{58C8BF86-1E64-8C49-8966-6473BA399A29}"/>
+              </a:ext>
+            </a:extLst>
+          </p:cNvPr>
+          <p:cNvSpPr/>
+          <p:nvPr/>
+        </p:nvSpPr>
+        <p:spPr>
+          <a:xfrm>
+            <a:off x="6548074" y="2569645"/>
+            <a:ext cx="1465866" cy="692727"/>
+          </a:xfrm>
+          <a:prstGeom prst="roundRect">
+            <a:avLst>
+              <a:gd name="adj" fmla="val 3278"/>
+            </a:avLst>
+          </a:prstGeom>
+        </p:spPr>
+        <p:style>
+          <a:lnRef idx="2">
+            <a:schemeClr val="dk1"/>
+          </a:lnRef>
+          <a:fillRef idx="1">
+            <a:schemeClr val="lt1"/>
+          </a:fillRef>
+          <a:effectRef idx="0">
+            <a:schemeClr val="dk1"/>
+          </a:effectRef>
+          <a:fontRef idx="minor">
+            <a:schemeClr val="dk1"/>
+          </a:fontRef>
+        </p:style>
+        <p:txBody>
+          <a:bodyPr rtlCol="0" anchor="ctr"/>
+          <a:lstStyle/>
+          <a:p>
+            <a:pPr algn="ctr"/>
+            <a:endParaRPr lang="en-US"/>
+          </a:p>
+        </p:txBody>
+      </p:sp>
+      <p:sp>
+        <p:nvSpPr>
+          <p:cNvPr id="17" name="TextBox 16">
+            <a:extLst>
+              <a:ext uri="{FF2B5EF4-FFF2-40B4-BE49-F238E27FC236}">
+                <a16:creationId xmlns:a16="http://schemas.microsoft.com/office/drawing/2014/main" id="{DCEEEF31-8722-0B47-910C-C0E0C24BF65B}"/>
+              </a:ext>
+            </a:extLst>
+          </p:cNvPr>
+          <p:cNvSpPr txBox="1"/>
+          <p:nvPr/>
+        </p:nvSpPr>
+        <p:spPr>
+          <a:xfrm>
+            <a:off x="6626410" y="2759042"/>
+            <a:ext cx="1309193" cy="313932"/>
+          </a:xfrm>
+          <a:prstGeom prst="rect">
+            <a:avLst/>
+          </a:prstGeom>
+          <a:ln>
+            <a:noFill/>
+          </a:ln>
+        </p:spPr>
+        <p:style>
+          <a:lnRef idx="2">
+            <a:schemeClr val="accent1"/>
+          </a:lnRef>
+          <a:fillRef idx="1">
+            <a:schemeClr val="lt1"/>
+          </a:fillRef>
+          <a:effectRef idx="0">
+            <a:schemeClr val="accent1"/>
+          </a:effectRef>
+          <a:fontRef idx="minor">
+            <a:schemeClr val="dk1"/>
+          </a:fontRef>
+        </p:style>
+        <p:txBody>
+          <a:bodyPr wrap="square" rtlCol="0">
+            <a:spAutoFit/>
+          </a:bodyPr>
+          <a:lstStyle/>
+          <a:p>
+            <a:pPr algn="ctr"/>
+            <a:r>
+              <a:rPr lang="en-US" sz="1440" dirty="0"/>
+              <a:t>Photodetector</a:t>
+            </a:r>
+          </a:p>
+        </p:txBody>
+      </p:sp>
+      <p:cxnSp>
+        <p:nvCxnSpPr>
+          <p:cNvPr id="19" name="Elbow Connector 18">
+            <a:extLst>
+              <a:ext uri="{FF2B5EF4-FFF2-40B4-BE49-F238E27FC236}">
+                <a16:creationId xmlns:a16="http://schemas.microsoft.com/office/drawing/2014/main" id="{02AFEE84-625C-3A48-B54D-07CC73AC86B5}"/>
+              </a:ext>
+            </a:extLst>
+          </p:cNvPr>
+          <p:cNvCxnSpPr>
+            <a:cxnSpLocks/>
+            <a:stCxn id="16" idx="2"/>
+            <a:endCxn id="7" idx="3"/>
+          </p:cNvCxnSpPr>
+          <p:nvPr/>
+        </p:nvCxnSpPr>
+        <p:spPr>
+          <a:xfrm rot="5400000">
+            <a:off x="5307710" y="1736951"/>
+            <a:ext cx="447876" cy="3498718"/>
+          </a:xfrm>
+          <a:prstGeom prst="bentConnector2">
+            <a:avLst/>
+          </a:prstGeom>
+          <a:ln w="19050">
+            <a:solidFill>
+              <a:schemeClr val="tx1">
+                <a:lumMod val="75000"/>
+                <a:lumOff val="25000"/>
+              </a:schemeClr>
+            </a:solidFill>
+            <a:prstDash val="dash"/>
+          </a:ln>
+        </p:spPr>
+        <p:style>
+          <a:lnRef idx="1">
+            <a:schemeClr val="accent1"/>
+          </a:lnRef>
+          <a:fillRef idx="0">
+            <a:schemeClr val="accent1"/>
+          </a:fillRef>
+          <a:effectRef idx="0">
+            <a:schemeClr val="accent1"/>
+          </a:effectRef>
+          <a:fontRef idx="minor">
+            <a:schemeClr val="tx1"/>
+          </a:fontRef>
+        </p:style>
+      </p:cxnSp>
+      <p:cxnSp>
+        <p:nvCxnSpPr>
+          <p:cNvPr id="22" name="Straight Connector 21">
+            <a:extLst>
+              <a:ext uri="{FF2B5EF4-FFF2-40B4-BE49-F238E27FC236}">
+                <a16:creationId xmlns:a16="http://schemas.microsoft.com/office/drawing/2014/main" id="{57030F05-76F8-4747-8ADF-7010AB5CD536}"/>
+              </a:ext>
+            </a:extLst>
+          </p:cNvPr>
+          <p:cNvCxnSpPr/>
+          <p:nvPr/>
+        </p:nvCxnSpPr>
+        <p:spPr>
+          <a:xfrm>
+            <a:off x="5849030" y="2911775"/>
+            <a:ext cx="586596" cy="0"/>
+          </a:xfrm>
+          <a:prstGeom prst="line">
+            <a:avLst/>
+          </a:prstGeom>
+          <a:ln>
+            <a:solidFill>
+              <a:srgbClr val="E3EA0B"/>
+            </a:solidFill>
+          </a:ln>
+        </p:spPr>
+        <p:style>
+          <a:lnRef idx="1">
+            <a:schemeClr val="accent1"/>
+          </a:lnRef>
+          <a:fillRef idx="0">
+            <a:schemeClr val="accent1"/>
+          </a:fillRef>
+          <a:effectRef idx="0">
+            <a:schemeClr val="accent1"/>
+          </a:effectRef>
+          <a:fontRef idx="minor">
+            <a:schemeClr val="tx1"/>
+          </a:fontRef>
+        </p:style>
+      </p:cxnSp>
+      <p:cxnSp>
+        <p:nvCxnSpPr>
+          <p:cNvPr id="23" name="Straight Connector 22">
+            <a:extLst>
+              <a:ext uri="{FF2B5EF4-FFF2-40B4-BE49-F238E27FC236}">
+                <a16:creationId xmlns:a16="http://schemas.microsoft.com/office/drawing/2014/main" id="{C4402275-01EE-F346-AD94-4A72A943D41E}"/>
+              </a:ext>
+            </a:extLst>
+          </p:cNvPr>
+          <p:cNvCxnSpPr/>
+          <p:nvPr/>
+        </p:nvCxnSpPr>
+        <p:spPr>
+          <a:xfrm>
+            <a:off x="5849030" y="2975956"/>
+            <a:ext cx="586596" cy="0"/>
+          </a:xfrm>
+          <a:prstGeom prst="line">
+            <a:avLst/>
+          </a:prstGeom>
+          <a:ln>
+            <a:solidFill>
+              <a:srgbClr val="E3EA0B"/>
+            </a:solidFill>
+          </a:ln>
+        </p:spPr>
+        <p:style>
+          <a:lnRef idx="1">
+            <a:schemeClr val="accent1"/>
+          </a:lnRef>
+          <a:fillRef idx="0">
+            <a:schemeClr val="accent1"/>
+          </a:fillRef>
+          <a:effectRef idx="0">
+            <a:schemeClr val="accent1"/>
+          </a:effectRef>
+          <a:fontRef idx="minor">
+            <a:schemeClr val="tx1"/>
+          </a:fontRef>
+        </p:style>
+      </p:cxnSp>
+      <p:cxnSp>
+        <p:nvCxnSpPr>
+          <p:cNvPr id="24" name="Straight Connector 23">
+            <a:extLst>
+              <a:ext uri="{FF2B5EF4-FFF2-40B4-BE49-F238E27FC236}">
+                <a16:creationId xmlns:a16="http://schemas.microsoft.com/office/drawing/2014/main" id="{2637A513-F455-C84A-BC83-2689E30D10E9}"/>
+              </a:ext>
+            </a:extLst>
+          </p:cNvPr>
+          <p:cNvCxnSpPr/>
+          <p:nvPr/>
+        </p:nvCxnSpPr>
+        <p:spPr>
+          <a:xfrm>
+            <a:off x="5849030" y="2850033"/>
+            <a:ext cx="586596" cy="0"/>
+          </a:xfrm>
+          <a:prstGeom prst="line">
+            <a:avLst/>
+          </a:prstGeom>
+          <a:ln>
+            <a:solidFill>
+              <a:srgbClr val="E3EA0B"/>
+            </a:solidFill>
+          </a:ln>
+        </p:spPr>
+        <p:style>
+          <a:lnRef idx="1">
+            <a:schemeClr val="accent1"/>
+          </a:lnRef>
+          <a:fillRef idx="0">
+            <a:schemeClr val="accent1"/>
+          </a:fillRef>
+          <a:effectRef idx="0">
+            <a:schemeClr val="accent1"/>
+          </a:effectRef>
+          <a:fontRef idx="minor">
+            <a:schemeClr val="tx1"/>
+          </a:fontRef>
+        </p:style>
+      </p:cxnSp>
+    </p:spTree>
+    <p:extLst>
+      <p:ext uri="{BB962C8B-B14F-4D97-AF65-F5344CB8AC3E}">
+        <p14:creationId xmlns:p14="http://schemas.microsoft.com/office/powerpoint/2010/main" val="3010567985"/>
+      </p:ext>
+    </p:extLst>
+  </p:cSld>
+  <p:clrMapOvr>
+    <a:masterClrMapping/>
+  </p:clrMapOvr>
+</p:sld>
+</file>
+
 <file path=ppt/slides/slide2.xml><?xml version="1.0" encoding="utf-8"?>
 <p:sld xmlns:a="http://schemas.openxmlformats.org/drawingml/2006/main" xmlns:r="http://schemas.openxmlformats.org/officeDocument/2006/relationships" xmlns:p="http://schemas.openxmlformats.org/presentationml/2006/main">
   <p:cSld>

</xml_diff>